<commit_message>
init Game AI Pro 大全
</commit_message>
<xml_diff>
--- a/assets/docs/Game AI Pro.pptx
+++ b/assets/docs/Game AI Pro.pptx
@@ -36538,7 +36538,7 @@
           <a:p>
             <a:fld id="{8290DB12-03F2-4ABB-BBBA-06717666C628}" type="datetimeFigureOut">
               <a:rPr lang="zh-CN" altLang="en-US" smtClean="0"/>
-              <a:t>2023/03/23</a:t>
+              <a:t>2023/03/27</a:t>
             </a:fld>
             <a:endParaRPr lang="zh-CN" altLang="en-US"/>
           </a:p>
@@ -36722,7 +36722,7 @@
             <a:fld id="{49E6EB02-D928-4D7D-A5C3-3BFD5F16BAC3}" type="datetimeFigureOut">
               <a:rPr lang="zh-CN" altLang="en-US" smtClean="0"/>
               <a:pPr/>
-              <a:t>2023/03/23</a:t>
+              <a:t>2023/03/27</a:t>
             </a:fld>
             <a:endParaRPr lang="zh-CN" altLang="en-US" dirty="0"/>
           </a:p>
@@ -38418,7 +38418,7 @@
           <a:p>
             <a:fld id="{5389230B-BED9-4B9B-87F6-51008F29D27F}" type="datetimeFigureOut">
               <a:rPr lang="zh-CN" altLang="en-US" smtClean="0"/>
-              <a:t>2023/03/23</a:t>
+              <a:t>2023/03/27</a:t>
             </a:fld>
             <a:endParaRPr lang="zh-CN" altLang="en-US" dirty="0"/>
           </a:p>
@@ -38616,7 +38616,7 @@
           <a:p>
             <a:fld id="{5389230B-BED9-4B9B-87F6-51008F29D27F}" type="datetimeFigureOut">
               <a:rPr lang="zh-CN" altLang="en-US" smtClean="0"/>
-              <a:t>2023/03/23</a:t>
+              <a:t>2023/03/27</a:t>
             </a:fld>
             <a:endParaRPr lang="zh-CN" altLang="en-US"/>
           </a:p>
@@ -38824,7 +38824,7 @@
           <a:p>
             <a:fld id="{5389230B-BED9-4B9B-87F6-51008F29D27F}" type="datetimeFigureOut">
               <a:rPr lang="zh-CN" altLang="en-US" smtClean="0"/>
-              <a:t>2023/03/23</a:t>
+              <a:t>2023/03/27</a:t>
             </a:fld>
             <a:endParaRPr lang="zh-CN" altLang="en-US"/>
           </a:p>
@@ -39022,7 +39022,7 @@
           <a:p>
             <a:fld id="{5389230B-BED9-4B9B-87F6-51008F29D27F}" type="datetimeFigureOut">
               <a:rPr lang="zh-CN" altLang="en-US" smtClean="0"/>
-              <a:t>2023/03/23</a:t>
+              <a:t>2023/03/27</a:t>
             </a:fld>
             <a:endParaRPr lang="zh-CN" altLang="en-US"/>
           </a:p>
@@ -39297,7 +39297,7 @@
           <a:p>
             <a:fld id="{5389230B-BED9-4B9B-87F6-51008F29D27F}" type="datetimeFigureOut">
               <a:rPr lang="zh-CN" altLang="en-US" smtClean="0"/>
-              <a:t>2023/03/23</a:t>
+              <a:t>2023/03/27</a:t>
             </a:fld>
             <a:endParaRPr lang="zh-CN" altLang="en-US"/>
           </a:p>
@@ -39562,7 +39562,7 @@
           <a:p>
             <a:fld id="{5389230B-BED9-4B9B-87F6-51008F29D27F}" type="datetimeFigureOut">
               <a:rPr lang="zh-CN" altLang="en-US" smtClean="0"/>
-              <a:t>2023/03/23</a:t>
+              <a:t>2023/03/27</a:t>
             </a:fld>
             <a:endParaRPr lang="zh-CN" altLang="en-US"/>
           </a:p>
@@ -39974,7 +39974,7 @@
           <a:p>
             <a:fld id="{5389230B-BED9-4B9B-87F6-51008F29D27F}" type="datetimeFigureOut">
               <a:rPr lang="zh-CN" altLang="en-US" smtClean="0"/>
-              <a:t>2023/03/23</a:t>
+              <a:t>2023/03/27</a:t>
             </a:fld>
             <a:endParaRPr lang="zh-CN" altLang="en-US"/>
           </a:p>
@@ -40115,7 +40115,7 @@
           <a:p>
             <a:fld id="{5389230B-BED9-4B9B-87F6-51008F29D27F}" type="datetimeFigureOut">
               <a:rPr lang="zh-CN" altLang="en-US" smtClean="0"/>
-              <a:t>2023/03/23</a:t>
+              <a:t>2023/03/27</a:t>
             </a:fld>
             <a:endParaRPr lang="zh-CN" altLang="en-US"/>
           </a:p>
@@ -40228,7 +40228,7 @@
           <a:p>
             <a:fld id="{5389230B-BED9-4B9B-87F6-51008F29D27F}" type="datetimeFigureOut">
               <a:rPr lang="zh-CN" altLang="en-US" smtClean="0"/>
-              <a:t>2023/03/23</a:t>
+              <a:t>2023/03/27</a:t>
             </a:fld>
             <a:endParaRPr lang="zh-CN" altLang="en-US"/>
           </a:p>
@@ -40539,7 +40539,7 @@
           <a:p>
             <a:fld id="{5389230B-BED9-4B9B-87F6-51008F29D27F}" type="datetimeFigureOut">
               <a:rPr lang="zh-CN" altLang="en-US" smtClean="0"/>
-              <a:t>2023/03/23</a:t>
+              <a:t>2023/03/27</a:t>
             </a:fld>
             <a:endParaRPr lang="zh-CN" altLang="en-US"/>
           </a:p>
@@ -40827,7 +40827,7 @@
           <a:p>
             <a:fld id="{5389230B-BED9-4B9B-87F6-51008F29D27F}" type="datetimeFigureOut">
               <a:rPr lang="zh-CN" altLang="en-US" smtClean="0"/>
-              <a:t>2023/03/23</a:t>
+              <a:t>2023/03/27</a:t>
             </a:fld>
             <a:endParaRPr lang="zh-CN" altLang="en-US"/>
           </a:p>
@@ -41071,7 +41071,7 @@
             <a:fld id="{5389230B-BED9-4B9B-87F6-51008F29D27F}" type="datetimeFigureOut">
               <a:rPr lang="zh-CN" altLang="en-US" smtClean="0"/>
               <a:pPr/>
-              <a:t>2023/03/23</a:t>
+              <a:t>2023/03/27</a:t>
             </a:fld>
             <a:endParaRPr lang="zh-CN" altLang="en-US" dirty="0"/>
           </a:p>

</xml_diff>

<commit_message>
jekyll build from Action ba85f2599ddc4357607a0247dcf18f26a1035abd
</commit_message>
<xml_diff>
--- a/assets/docs/Game AI Pro.pptx
+++ b/assets/docs/Game AI Pro.pptx
@@ -36538,7 +36538,7 @@
           <a:p>
             <a:fld id="{8290DB12-03F2-4ABB-BBBA-06717666C628}" type="datetimeFigureOut">
               <a:rPr lang="zh-CN" altLang="en-US" smtClean="0"/>
-              <a:t>2023/03/23</a:t>
+              <a:t>2023/03/27</a:t>
             </a:fld>
             <a:endParaRPr lang="zh-CN" altLang="en-US"/>
           </a:p>
@@ -36722,7 +36722,7 @@
             <a:fld id="{49E6EB02-D928-4D7D-A5C3-3BFD5F16BAC3}" type="datetimeFigureOut">
               <a:rPr lang="zh-CN" altLang="en-US" smtClean="0"/>
               <a:pPr/>
-              <a:t>2023/03/23</a:t>
+              <a:t>2023/03/27</a:t>
             </a:fld>
             <a:endParaRPr lang="zh-CN" altLang="en-US" dirty="0"/>
           </a:p>
@@ -38418,7 +38418,7 @@
           <a:p>
             <a:fld id="{5389230B-BED9-4B9B-87F6-51008F29D27F}" type="datetimeFigureOut">
               <a:rPr lang="zh-CN" altLang="en-US" smtClean="0"/>
-              <a:t>2023/03/23</a:t>
+              <a:t>2023/03/27</a:t>
             </a:fld>
             <a:endParaRPr lang="zh-CN" altLang="en-US" dirty="0"/>
           </a:p>
@@ -38616,7 +38616,7 @@
           <a:p>
             <a:fld id="{5389230B-BED9-4B9B-87F6-51008F29D27F}" type="datetimeFigureOut">
               <a:rPr lang="zh-CN" altLang="en-US" smtClean="0"/>
-              <a:t>2023/03/23</a:t>
+              <a:t>2023/03/27</a:t>
             </a:fld>
             <a:endParaRPr lang="zh-CN" altLang="en-US"/>
           </a:p>
@@ -38824,7 +38824,7 @@
           <a:p>
             <a:fld id="{5389230B-BED9-4B9B-87F6-51008F29D27F}" type="datetimeFigureOut">
               <a:rPr lang="zh-CN" altLang="en-US" smtClean="0"/>
-              <a:t>2023/03/23</a:t>
+              <a:t>2023/03/27</a:t>
             </a:fld>
             <a:endParaRPr lang="zh-CN" altLang="en-US"/>
           </a:p>
@@ -39022,7 +39022,7 @@
           <a:p>
             <a:fld id="{5389230B-BED9-4B9B-87F6-51008F29D27F}" type="datetimeFigureOut">
               <a:rPr lang="zh-CN" altLang="en-US" smtClean="0"/>
-              <a:t>2023/03/23</a:t>
+              <a:t>2023/03/27</a:t>
             </a:fld>
             <a:endParaRPr lang="zh-CN" altLang="en-US"/>
           </a:p>
@@ -39297,7 +39297,7 @@
           <a:p>
             <a:fld id="{5389230B-BED9-4B9B-87F6-51008F29D27F}" type="datetimeFigureOut">
               <a:rPr lang="zh-CN" altLang="en-US" smtClean="0"/>
-              <a:t>2023/03/23</a:t>
+              <a:t>2023/03/27</a:t>
             </a:fld>
             <a:endParaRPr lang="zh-CN" altLang="en-US"/>
           </a:p>
@@ -39562,7 +39562,7 @@
           <a:p>
             <a:fld id="{5389230B-BED9-4B9B-87F6-51008F29D27F}" type="datetimeFigureOut">
               <a:rPr lang="zh-CN" altLang="en-US" smtClean="0"/>
-              <a:t>2023/03/23</a:t>
+              <a:t>2023/03/27</a:t>
             </a:fld>
             <a:endParaRPr lang="zh-CN" altLang="en-US"/>
           </a:p>
@@ -39974,7 +39974,7 @@
           <a:p>
             <a:fld id="{5389230B-BED9-4B9B-87F6-51008F29D27F}" type="datetimeFigureOut">
               <a:rPr lang="zh-CN" altLang="en-US" smtClean="0"/>
-              <a:t>2023/03/23</a:t>
+              <a:t>2023/03/27</a:t>
             </a:fld>
             <a:endParaRPr lang="zh-CN" altLang="en-US"/>
           </a:p>
@@ -40115,7 +40115,7 @@
           <a:p>
             <a:fld id="{5389230B-BED9-4B9B-87F6-51008F29D27F}" type="datetimeFigureOut">
               <a:rPr lang="zh-CN" altLang="en-US" smtClean="0"/>
-              <a:t>2023/03/23</a:t>
+              <a:t>2023/03/27</a:t>
             </a:fld>
             <a:endParaRPr lang="zh-CN" altLang="en-US"/>
           </a:p>
@@ -40228,7 +40228,7 @@
           <a:p>
             <a:fld id="{5389230B-BED9-4B9B-87F6-51008F29D27F}" type="datetimeFigureOut">
               <a:rPr lang="zh-CN" altLang="en-US" smtClean="0"/>
-              <a:t>2023/03/23</a:t>
+              <a:t>2023/03/27</a:t>
             </a:fld>
             <a:endParaRPr lang="zh-CN" altLang="en-US"/>
           </a:p>
@@ -40539,7 +40539,7 @@
           <a:p>
             <a:fld id="{5389230B-BED9-4B9B-87F6-51008F29D27F}" type="datetimeFigureOut">
               <a:rPr lang="zh-CN" altLang="en-US" smtClean="0"/>
-              <a:t>2023/03/23</a:t>
+              <a:t>2023/03/27</a:t>
             </a:fld>
             <a:endParaRPr lang="zh-CN" altLang="en-US"/>
           </a:p>
@@ -40827,7 +40827,7 @@
           <a:p>
             <a:fld id="{5389230B-BED9-4B9B-87F6-51008F29D27F}" type="datetimeFigureOut">
               <a:rPr lang="zh-CN" altLang="en-US" smtClean="0"/>
-              <a:t>2023/03/23</a:t>
+              <a:t>2023/03/27</a:t>
             </a:fld>
             <a:endParaRPr lang="zh-CN" altLang="en-US"/>
           </a:p>
@@ -41071,7 +41071,7 @@
             <a:fld id="{5389230B-BED9-4B9B-87F6-51008F29D27F}" type="datetimeFigureOut">
               <a:rPr lang="zh-CN" altLang="en-US" smtClean="0"/>
               <a:pPr/>
-              <a:t>2023/03/23</a:t>
+              <a:t>2023/03/27</a:t>
             </a:fld>
             <a:endParaRPr lang="zh-CN" altLang="en-US" dirty="0"/>
           </a:p>

</xml_diff>